<commit_message>
Modified the Java design slide.
</commit_message>
<xml_diff>
--- a/src/frontend/ECJ_ROSE_Connection/JavaDesignInROSE.pptx
+++ b/src/frontend/ECJ_ROSE_Connection/JavaDesignInROSE.pptx
@@ -3174,7 +3174,12 @@
             <p:ph type="title"/>
           </p:nvPr>
         </p:nvSpPr>
-        <p:spPr/>
+        <p:spPr>
+          <a:xfrm>
+            <a:off x="467387" y="217878"/>
+            <a:ext cx="8229600" cy="799839"/>
+          </a:xfrm>
+        </p:spPr>
         <p:txBody>
           <a:bodyPr/>
           <a:lstStyle/>
@@ -3472,7 +3477,7 @@
         </p:nvSpPr>
         <p:spPr>
           <a:xfrm>
-            <a:off x="169546" y="1301144"/>
+            <a:off x="3399100" y="1133164"/>
             <a:ext cx="2361814" cy="335960"/>
           </a:xfrm>
           <a:prstGeom prst="foldedCorner">
@@ -4021,19 +4026,17 @@
           <p:cNvPr id="36" name="Curved Connector 35"/>
           <p:cNvCxnSpPr>
             <a:stCxn id="17" idx="2"/>
-            <a:endCxn id="20" idx="0"/>
+            <a:endCxn id="25" idx="1"/>
           </p:cNvCxnSpPr>
           <p:nvPr/>
         </p:nvCxnSpPr>
         <p:spPr>
           <a:xfrm rot="16200000" flipH="1">
-            <a:off x="1476138" y="1511418"/>
-            <a:ext cx="423622" cy="674993"/>
+            <a:off x="4413131" y="1636000"/>
+            <a:ext cx="790722" cy="456970"/>
           </a:xfrm>
-          <a:prstGeom prst="curvedConnector3">
-            <a:avLst>
-              <a:gd name="adj1" fmla="val 50000"/>
-            </a:avLst>
+          <a:prstGeom prst="curvedConnector2">
+            <a:avLst/>
           </a:prstGeom>
           <a:ln>
             <a:tailEnd type="arrow"/>
@@ -4249,7 +4252,7 @@
         </p:nvSpPr>
         <p:spPr>
           <a:xfrm>
-            <a:off x="6015197" y="6233463"/>
+            <a:off x="6281208" y="6233463"/>
             <a:ext cx="1896374" cy="557735"/>
           </a:xfrm>
           <a:prstGeom prst="trapezoid">
@@ -4299,7 +4302,7 @@
         </p:nvSpPr>
         <p:spPr>
           <a:xfrm>
-            <a:off x="1533913" y="6205889"/>
+            <a:off x="3401280" y="6190259"/>
             <a:ext cx="2361814" cy="634960"/>
           </a:xfrm>
           <a:prstGeom prst="foldedCorner">
@@ -4361,9 +4364,9 @@
           <p:nvPr/>
         </p:nvCxnSpPr>
         <p:spPr>
-          <a:xfrm rot="10800000" flipV="1">
-            <a:off x="3895728" y="6512331"/>
-            <a:ext cx="2189187" cy="11038"/>
+          <a:xfrm rot="10800000">
+            <a:off x="5763095" y="6507739"/>
+            <a:ext cx="587831" cy="4592"/>
           </a:xfrm>
           <a:prstGeom prst="curvedConnector3">
             <a:avLst>
@@ -4400,12 +4403,12 @@
         </p:nvCxnSpPr>
         <p:spPr>
           <a:xfrm flipH="1">
-            <a:off x="7841854" y="2259846"/>
-            <a:ext cx="996439" cy="4252485"/>
+            <a:off x="8107865" y="2259846"/>
+            <a:ext cx="730428" cy="4252485"/>
           </a:xfrm>
           <a:prstGeom prst="curvedConnector3">
             <a:avLst>
-              <a:gd name="adj1" fmla="val -22942"/>
+              <a:gd name="adj1" fmla="val -31297"/>
             </a:avLst>
           </a:prstGeom>
           <a:ln>
@@ -4483,6 +4486,42 @@
             <a:avLst>
               <a:gd name="adj1" fmla="val 212616"/>
             </a:avLst>
+          </a:prstGeom>
+          <a:ln>
+            <a:tailEnd type="arrow"/>
+          </a:ln>
+        </p:spPr>
+        <p:style>
+          <a:lnRef idx="2">
+            <a:schemeClr val="accent1"/>
+          </a:lnRef>
+          <a:fillRef idx="0">
+            <a:schemeClr val="accent1"/>
+          </a:fillRef>
+          <a:effectRef idx="1">
+            <a:schemeClr val="accent1"/>
+          </a:effectRef>
+          <a:fontRef idx="minor">
+            <a:schemeClr val="tx1"/>
+          </a:fontRef>
+        </p:style>
+      </p:cxnSp>
+      <p:cxnSp>
+        <p:nvCxnSpPr>
+          <p:cNvPr id="103" name="Curved Connector 102"/>
+          <p:cNvCxnSpPr>
+            <a:stCxn id="25" idx="1"/>
+            <a:endCxn id="20" idx="3"/>
+          </p:cNvCxnSpPr>
+          <p:nvPr/>
+        </p:nvCxnSpPr>
+        <p:spPr>
+          <a:xfrm rot="10800000" flipV="1">
+            <a:off x="3550411" y="2259845"/>
+            <a:ext cx="1486567" cy="1"/>
+          </a:xfrm>
+          <a:prstGeom prst="curvedConnector3">
+            <a:avLst/>
           </a:prstGeom>
           <a:ln>
             <a:tailEnd type="arrow"/>

</xml_diff>